<commit_message>
Semana 7 - UDP
</commit_message>
<xml_diff>
--- a/Semana 7/Presentación.pptx
+++ b/Semana 7/Presentación.pptx
@@ -212,7 +212,7 @@
           <a:p>
             <a:fld id="{430AAACB-714D-4ED6-9BCD-E10DE1E326CF}" type="datetimeFigureOut">
               <a:rPr lang="es-CO" smtClean="0"/>
-              <a:t>4/03/2019</a:t>
+              <a:t>5/03/2019</a:t>
             </a:fld>
             <a:endParaRPr lang="es-CO"/>
           </a:p>
@@ -706,7 +706,7 @@
           <a:p>
             <a:fld id="{C214C790-AC43-4046-BAB7-879940BCF0AB}" type="datetimeFigureOut">
               <a:rPr lang="es-CO" smtClean="0"/>
-              <a:t>4/03/2019</a:t>
+              <a:t>5/03/2019</a:t>
             </a:fld>
             <a:endParaRPr lang="es-CO"/>
           </a:p>
@@ -914,7 +914,7 @@
           <a:p>
             <a:fld id="{C214C790-AC43-4046-BAB7-879940BCF0AB}" type="datetimeFigureOut">
               <a:rPr lang="es-CO" smtClean="0"/>
-              <a:t>4/03/2019</a:t>
+              <a:t>5/03/2019</a:t>
             </a:fld>
             <a:endParaRPr lang="es-CO"/>
           </a:p>
@@ -1170,7 +1170,7 @@
           <a:p>
             <a:fld id="{C214C790-AC43-4046-BAB7-879940BCF0AB}" type="datetimeFigureOut">
               <a:rPr lang="es-CO" smtClean="0"/>
-              <a:t>4/03/2019</a:t>
+              <a:t>5/03/2019</a:t>
             </a:fld>
             <a:endParaRPr lang="es-CO"/>
           </a:p>
@@ -1340,7 +1340,7 @@
           <a:p>
             <a:fld id="{C214C790-AC43-4046-BAB7-879940BCF0AB}" type="datetimeFigureOut">
               <a:rPr lang="es-CO" smtClean="0"/>
-              <a:t>4/03/2019</a:t>
+              <a:t>5/03/2019</a:t>
             </a:fld>
             <a:endParaRPr lang="es-CO"/>
           </a:p>
@@ -1683,7 +1683,7 @@
           <a:p>
             <a:fld id="{C214C790-AC43-4046-BAB7-879940BCF0AB}" type="datetimeFigureOut">
               <a:rPr lang="es-CO" smtClean="0"/>
-              <a:t>4/03/2019</a:t>
+              <a:t>5/03/2019</a:t>
             </a:fld>
             <a:endParaRPr lang="es-CO"/>
           </a:p>
@@ -1958,7 +1958,7 @@
           <a:p>
             <a:fld id="{C214C790-AC43-4046-BAB7-879940BCF0AB}" type="datetimeFigureOut">
               <a:rPr lang="es-CO" smtClean="0"/>
-              <a:t>4/03/2019</a:t>
+              <a:t>5/03/2019</a:t>
             </a:fld>
             <a:endParaRPr lang="es-CO"/>
           </a:p>
@@ -2337,7 +2337,7 @@
           <a:p>
             <a:fld id="{C214C790-AC43-4046-BAB7-879940BCF0AB}" type="datetimeFigureOut">
               <a:rPr lang="es-CO" smtClean="0"/>
-              <a:t>4/03/2019</a:t>
+              <a:t>5/03/2019</a:t>
             </a:fld>
             <a:endParaRPr lang="es-CO"/>
           </a:p>
@@ -2455,7 +2455,7 @@
           <a:p>
             <a:fld id="{C214C790-AC43-4046-BAB7-879940BCF0AB}" type="datetimeFigureOut">
               <a:rPr lang="es-CO" smtClean="0"/>
-              <a:t>4/03/2019</a:t>
+              <a:t>5/03/2019</a:t>
             </a:fld>
             <a:endParaRPr lang="es-CO"/>
           </a:p>
@@ -2626,7 +2626,7 @@
           <a:p>
             <a:fld id="{C214C790-AC43-4046-BAB7-879940BCF0AB}" type="datetimeFigureOut">
               <a:rPr lang="es-CO" smtClean="0"/>
-              <a:t>4/03/2019</a:t>
+              <a:t>5/03/2019</a:t>
             </a:fld>
             <a:endParaRPr lang="es-CO"/>
           </a:p>
@@ -2980,7 +2980,7 @@
           <a:p>
             <a:fld id="{C214C790-AC43-4046-BAB7-879940BCF0AB}" type="datetimeFigureOut">
               <a:rPr lang="es-CO" smtClean="0"/>
-              <a:t>4/03/2019</a:t>
+              <a:t>5/03/2019</a:t>
             </a:fld>
             <a:endParaRPr lang="es-CO"/>
           </a:p>
@@ -3357,7 +3357,7 @@
           <a:p>
             <a:fld id="{C214C790-AC43-4046-BAB7-879940BCF0AB}" type="datetimeFigureOut">
               <a:rPr lang="es-CO" smtClean="0"/>
-              <a:t>4/03/2019</a:t>
+              <a:t>5/03/2019</a:t>
             </a:fld>
             <a:endParaRPr lang="es-CO"/>
           </a:p>
@@ -3644,7 +3644,7 @@
           <a:p>
             <a:fld id="{C214C790-AC43-4046-BAB7-879940BCF0AB}" type="datetimeFigureOut">
               <a:rPr lang="es-CO" smtClean="0"/>
-              <a:t>4/03/2019</a:t>
+              <a:t>5/03/2019</a:t>
             </a:fld>
             <a:endParaRPr lang="es-CO"/>
           </a:p>
@@ -4185,7 +4185,11 @@
           <a:p>
             <a:r>
               <a:rPr lang="es-ES" dirty="0" smtClean="0"/>
-              <a:t>Semana 6</a:t>
+              <a:t>Semana </a:t>
+            </a:r>
+            <a:r>
+              <a:rPr lang="es-ES" dirty="0" smtClean="0"/>
+              <a:t>7</a:t>
             </a:r>
             <a:endParaRPr lang="es-CO" dirty="0"/>
           </a:p>
@@ -4210,7 +4214,6 @@
               <a:rPr lang="es-ES" dirty="0" smtClean="0"/>
               <a:t>UDP</a:t>
             </a:r>
-            <a:endParaRPr lang="es-ES" dirty="0" smtClean="0"/>
           </a:p>
         </p:txBody>
       </p:sp>
@@ -5388,6 +5391,13 @@
   <p:clrMapOvr>
     <a:masterClrMapping/>
   </p:clrMapOvr>
+  <p:timing>
+    <p:tnLst>
+      <p:par>
+        <p:cTn id="1" dur="indefinite" restart="never" nodeType="tmRoot"/>
+      </p:par>
+    </p:tnLst>
+  </p:timing>
 </p:sld>
 </file>
 
@@ -6545,6 +6555,13 @@
   <p:clrMapOvr>
     <a:masterClrMapping/>
   </p:clrMapOvr>
+  <p:timing>
+    <p:tnLst>
+      <p:par>
+        <p:cTn id="1" dur="indefinite" restart="never" nodeType="tmRoot"/>
+      </p:par>
+    </p:tnLst>
+  </p:timing>
 </p:sld>
 </file>
 
@@ -7702,6 +7719,13 @@
   <p:clrMapOvr>
     <a:masterClrMapping/>
   </p:clrMapOvr>
+  <p:timing>
+    <p:tnLst>
+      <p:par>
+        <p:cTn id="1" dur="indefinite" restart="never" nodeType="tmRoot"/>
+      </p:par>
+    </p:tnLst>
+  </p:timing>
 </p:sld>
 </file>
 
@@ -8859,6 +8883,13 @@
   <p:clrMapOvr>
     <a:masterClrMapping/>
   </p:clrMapOvr>
+  <p:timing>
+    <p:tnLst>
+      <p:par>
+        <p:cTn id="1" dur="indefinite" restart="never" nodeType="tmRoot"/>
+      </p:par>
+    </p:tnLst>
+  </p:timing>
 </p:sld>
 </file>
 
@@ -8965,6 +8996,13 @@
   <p:clrMapOvr>
     <a:masterClrMapping/>
   </p:clrMapOvr>
+  <p:timing>
+    <p:tnLst>
+      <p:par>
+        <p:cTn id="1" dur="indefinite" restart="never" nodeType="tmRoot"/>
+      </p:par>
+    </p:tnLst>
+  </p:timing>
 </p:sld>
 </file>
 
@@ -9095,7 +9133,51 @@
             </a:r>
             <a:r>
               <a:rPr lang="es-ES" dirty="0" smtClean="0"/>
-              <a:t> a través de todos los computadores del equipo, de modo que cuando llegue al PC del profesor, el mensaje contenga la dirección IP por donde pasó el mensaje.</a:t>
+              <a:t> a través de todos los computadores del equipo, de modo que cuando llegue al PC del profesor, el mensaje contenga la dirección IP por donde pasó el mensaje</a:t>
+            </a:r>
+            <a:r>
+              <a:rPr lang="es-ES" dirty="0" smtClean="0"/>
+              <a:t>.</a:t>
+            </a:r>
+          </a:p>
+          <a:p>
+            <a:pPr marL="201168" lvl="1" indent="0">
+              <a:buNone/>
+            </a:pPr>
+            <a:endParaRPr lang="es-ES" dirty="0" smtClean="0"/>
+          </a:p>
+          <a:p>
+            <a:pPr marL="201168" lvl="1" indent="0">
+              <a:buNone/>
+            </a:pPr>
+            <a:r>
+              <a:rPr lang="es-ES" dirty="0" smtClean="0"/>
+              <a:t>Nicolás, Nelson, Santiago, Carlos y Germán : 5.0</a:t>
+            </a:r>
+          </a:p>
+          <a:p>
+            <a:pPr marL="201168" lvl="1" indent="0">
+              <a:buNone/>
+            </a:pPr>
+            <a:r>
+              <a:rPr lang="es-ES" dirty="0" err="1" smtClean="0"/>
+              <a:t>Velez</a:t>
+            </a:r>
+            <a:r>
+              <a:rPr lang="es-ES" dirty="0" smtClean="0"/>
+              <a:t>, Paz, </a:t>
+            </a:r>
+            <a:r>
+              <a:rPr lang="es-ES" dirty="0" err="1" smtClean="0"/>
+              <a:t>Melqui</a:t>
+            </a:r>
+            <a:r>
+              <a:rPr lang="es-ES" dirty="0" smtClean="0"/>
+              <a:t>, Daniel, Jefferson</a:t>
+            </a:r>
+            <a:r>
+              <a:rPr lang="es-ES" smtClean="0"/>
+              <a:t>: 4.0</a:t>
             </a:r>
             <a:endParaRPr lang="es-ES" dirty="0" smtClean="0"/>
           </a:p>
@@ -9111,6 +9193,13 @@
   <p:clrMapOvr>
     <a:masterClrMapping/>
   </p:clrMapOvr>
+  <p:timing>
+    <p:tnLst>
+      <p:par>
+        <p:cTn id="1" dur="indefinite" restart="never" nodeType="tmRoot"/>
+      </p:par>
+    </p:tnLst>
+  </p:timing>
 </p:sld>
 </file>
 
@@ -9252,6 +9341,13 @@
   <p:clrMapOvr>
     <a:masterClrMapping/>
   </p:clrMapOvr>
+  <p:timing>
+    <p:tnLst>
+      <p:par>
+        <p:cTn id="1" dur="indefinite" restart="never" nodeType="tmRoot"/>
+      </p:par>
+    </p:tnLst>
+  </p:timing>
 </p:sld>
 </file>
 
@@ -9434,11 +9530,7 @@
           <a:p>
             <a:r>
               <a:rPr lang="es-ES" dirty="0" smtClean="0"/>
-              <a:t>El mensaje UDP es llamado </a:t>
-            </a:r>
-            <a:r>
-              <a:rPr lang="es-ES" dirty="0" smtClean="0"/>
-              <a:t>como </a:t>
+              <a:t>El mensaje UDP es llamado como </a:t>
             </a:r>
             <a:r>
               <a:rPr lang="es-ES" b="1" dirty="0" err="1" smtClean="0"/>
@@ -9716,6 +9808,13 @@
   <p:clrMapOvr>
     <a:masterClrMapping/>
   </p:clrMapOvr>
+  <p:timing>
+    <p:tnLst>
+      <p:par>
+        <p:cTn id="1" dur="indefinite" restart="never" nodeType="tmRoot"/>
+      </p:par>
+    </p:tnLst>
+  </p:timing>
 </p:sld>
 </file>
 
@@ -10250,6 +10349,13 @@
   <p:clrMapOvr>
     <a:masterClrMapping/>
   </p:clrMapOvr>
+  <p:timing>
+    <p:tnLst>
+      <p:par>
+        <p:cTn id="1" dur="indefinite" restart="never" nodeType="tmRoot"/>
+      </p:par>
+    </p:tnLst>
+  </p:timing>
 </p:sld>
 </file>
 
@@ -11407,6 +11513,13 @@
   <p:clrMapOvr>
     <a:masterClrMapping/>
   </p:clrMapOvr>
+  <p:timing>
+    <p:tnLst>
+      <p:par>
+        <p:cTn id="1" dur="indefinite" restart="never" nodeType="tmRoot"/>
+      </p:par>
+    </p:tnLst>
+  </p:timing>
 </p:sld>
 </file>
 
@@ -12564,6 +12677,13 @@
   <p:clrMapOvr>
     <a:masterClrMapping/>
   </p:clrMapOvr>
+  <p:timing>
+    <p:tnLst>
+      <p:par>
+        <p:cTn id="1" dur="indefinite" restart="never" nodeType="tmRoot"/>
+      </p:par>
+    </p:tnLst>
+  </p:timing>
 </p:sld>
 </file>
 
@@ -13721,6 +13841,13 @@
   <p:clrMapOvr>
     <a:masterClrMapping/>
   </p:clrMapOvr>
+  <p:timing>
+    <p:tnLst>
+      <p:par>
+        <p:cTn id="1" dur="indefinite" restart="never" nodeType="tmRoot"/>
+      </p:par>
+    </p:tnLst>
+  </p:timing>
 </p:sld>
 </file>
 
@@ -14878,6 +15005,13 @@
   <p:clrMapOvr>
     <a:masterClrMapping/>
   </p:clrMapOvr>
+  <p:timing>
+    <p:tnLst>
+      <p:par>
+        <p:cTn id="1" dur="indefinite" restart="never" nodeType="tmRoot"/>
+      </p:par>
+    </p:tnLst>
+  </p:timing>
 </p:sld>
 </file>
 
@@ -16035,6 +16169,13 @@
   <p:clrMapOvr>
     <a:masterClrMapping/>
   </p:clrMapOvr>
+  <p:timing>
+    <p:tnLst>
+      <p:par>
+        <p:cTn id="1" dur="indefinite" restart="never" nodeType="tmRoot"/>
+      </p:par>
+    </p:tnLst>
+  </p:timing>
 </p:sld>
 </file>
 

</xml_diff>

<commit_message>
Procedimientos para obtener máscaras de subred y las direcciones de red
</commit_message>
<xml_diff>
--- a/Semana 7/Presentación.pptx
+++ b/Semana 7/Presentación.pptx
@@ -5,7 +5,7 @@
     <p:sldMasterId id="2147483672" r:id="rId1"/>
   </p:sldMasterIdLst>
   <p:notesMasterIdLst>
-    <p:notesMasterId r:id="rId25"/>
+    <p:notesMasterId r:id="rId26"/>
   </p:notesMasterIdLst>
   <p:sldIdLst>
     <p:sldId id="256" r:id="rId2"/>
@@ -31,6 +31,7 @@
     <p:sldId id="333" r:id="rId22"/>
     <p:sldId id="334" r:id="rId23"/>
     <p:sldId id="335" r:id="rId24"/>
+    <p:sldId id="336" r:id="rId25"/>
   </p:sldIdLst>
   <p:sldSz cx="12192000" cy="6858000"/>
   <p:notesSz cx="6858000" cy="9144000"/>
@@ -219,7 +220,7 @@
           <a:p>
             <a:fld id="{430AAACB-714D-4ED6-9BCD-E10DE1E326CF}" type="datetimeFigureOut">
               <a:rPr lang="es-CO" smtClean="0"/>
-              <a:t>6/03/2019</a:t>
+              <a:t>7/03/2019</a:t>
             </a:fld>
             <a:endParaRPr lang="es-CO"/>
           </a:p>
@@ -713,7 +714,7 @@
           <a:p>
             <a:fld id="{C214C790-AC43-4046-BAB7-879940BCF0AB}" type="datetimeFigureOut">
               <a:rPr lang="es-CO" smtClean="0"/>
-              <a:t>6/03/2019</a:t>
+              <a:t>7/03/2019</a:t>
             </a:fld>
             <a:endParaRPr lang="es-CO"/>
           </a:p>
@@ -921,7 +922,7 @@
           <a:p>
             <a:fld id="{C214C790-AC43-4046-BAB7-879940BCF0AB}" type="datetimeFigureOut">
               <a:rPr lang="es-CO" smtClean="0"/>
-              <a:t>6/03/2019</a:t>
+              <a:t>7/03/2019</a:t>
             </a:fld>
             <a:endParaRPr lang="es-CO"/>
           </a:p>
@@ -1177,7 +1178,7 @@
           <a:p>
             <a:fld id="{C214C790-AC43-4046-BAB7-879940BCF0AB}" type="datetimeFigureOut">
               <a:rPr lang="es-CO" smtClean="0"/>
-              <a:t>6/03/2019</a:t>
+              <a:t>7/03/2019</a:t>
             </a:fld>
             <a:endParaRPr lang="es-CO"/>
           </a:p>
@@ -1347,7 +1348,7 @@
           <a:p>
             <a:fld id="{C214C790-AC43-4046-BAB7-879940BCF0AB}" type="datetimeFigureOut">
               <a:rPr lang="es-CO" smtClean="0"/>
-              <a:t>6/03/2019</a:t>
+              <a:t>7/03/2019</a:t>
             </a:fld>
             <a:endParaRPr lang="es-CO"/>
           </a:p>
@@ -1690,7 +1691,7 @@
           <a:p>
             <a:fld id="{C214C790-AC43-4046-BAB7-879940BCF0AB}" type="datetimeFigureOut">
               <a:rPr lang="es-CO" smtClean="0"/>
-              <a:t>6/03/2019</a:t>
+              <a:t>7/03/2019</a:t>
             </a:fld>
             <a:endParaRPr lang="es-CO"/>
           </a:p>
@@ -1965,7 +1966,7 @@
           <a:p>
             <a:fld id="{C214C790-AC43-4046-BAB7-879940BCF0AB}" type="datetimeFigureOut">
               <a:rPr lang="es-CO" smtClean="0"/>
-              <a:t>6/03/2019</a:t>
+              <a:t>7/03/2019</a:t>
             </a:fld>
             <a:endParaRPr lang="es-CO"/>
           </a:p>
@@ -2344,7 +2345,7 @@
           <a:p>
             <a:fld id="{C214C790-AC43-4046-BAB7-879940BCF0AB}" type="datetimeFigureOut">
               <a:rPr lang="es-CO" smtClean="0"/>
-              <a:t>6/03/2019</a:t>
+              <a:t>7/03/2019</a:t>
             </a:fld>
             <a:endParaRPr lang="es-CO"/>
           </a:p>
@@ -2462,7 +2463,7 @@
           <a:p>
             <a:fld id="{C214C790-AC43-4046-BAB7-879940BCF0AB}" type="datetimeFigureOut">
               <a:rPr lang="es-CO" smtClean="0"/>
-              <a:t>6/03/2019</a:t>
+              <a:t>7/03/2019</a:t>
             </a:fld>
             <a:endParaRPr lang="es-CO"/>
           </a:p>
@@ -2633,7 +2634,7 @@
           <a:p>
             <a:fld id="{C214C790-AC43-4046-BAB7-879940BCF0AB}" type="datetimeFigureOut">
               <a:rPr lang="es-CO" smtClean="0"/>
-              <a:t>6/03/2019</a:t>
+              <a:t>7/03/2019</a:t>
             </a:fld>
             <a:endParaRPr lang="es-CO"/>
           </a:p>
@@ -2987,7 +2988,7 @@
           <a:p>
             <a:fld id="{C214C790-AC43-4046-BAB7-879940BCF0AB}" type="datetimeFigureOut">
               <a:rPr lang="es-CO" smtClean="0"/>
-              <a:t>6/03/2019</a:t>
+              <a:t>7/03/2019</a:t>
             </a:fld>
             <a:endParaRPr lang="es-CO"/>
           </a:p>
@@ -3364,7 +3365,7 @@
           <a:p>
             <a:fld id="{C214C790-AC43-4046-BAB7-879940BCF0AB}" type="datetimeFigureOut">
               <a:rPr lang="es-CO" smtClean="0"/>
-              <a:t>6/03/2019</a:t>
+              <a:t>7/03/2019</a:t>
             </a:fld>
             <a:endParaRPr lang="es-CO"/>
           </a:p>
@@ -3651,7 +3652,7 @@
           <a:p>
             <a:fld id="{C214C790-AC43-4046-BAB7-879940BCF0AB}" type="datetimeFigureOut">
               <a:rPr lang="es-CO" smtClean="0"/>
-              <a:t>6/03/2019</a:t>
+              <a:t>7/03/2019</a:t>
             </a:fld>
             <a:endParaRPr lang="es-CO"/>
           </a:p>
@@ -9813,6 +9814,13 @@
   <p:clrMapOvr>
     <a:masterClrMapping/>
   </p:clrMapOvr>
+  <p:timing>
+    <p:tnLst>
+      <p:par>
+        <p:cTn id="1" dur="indefinite" restart="never" nodeType="tmRoot"/>
+      </p:par>
+    </p:tnLst>
+  </p:timing>
 </p:sld>
 </file>
 
@@ -10318,6 +10326,13 @@
   <p:clrMapOvr>
     <a:masterClrMapping/>
   </p:clrMapOvr>
+  <p:timing>
+    <p:tnLst>
+      <p:par>
+        <p:cTn id="1" dur="indefinite" restart="never" nodeType="tmRoot"/>
+      </p:par>
+    </p:tnLst>
+  </p:timing>
 </p:sld>
 </file>
 
@@ -10823,6 +10838,13 @@
   <p:clrMapOvr>
     <a:masterClrMapping/>
   </p:clrMapOvr>
+  <p:timing>
+    <p:tnLst>
+      <p:par>
+        <p:cTn id="1" dur="indefinite" restart="never" nodeType="tmRoot"/>
+      </p:par>
+    </p:tnLst>
+  </p:timing>
 </p:sld>
 </file>
 
@@ -11429,6 +11451,13 @@
   <p:clrMapOvr>
     <a:masterClrMapping/>
   </p:clrMapOvr>
+  <p:timing>
+    <p:tnLst>
+      <p:par>
+        <p:cTn id="1" dur="indefinite" restart="never" nodeType="tmRoot"/>
+      </p:par>
+    </p:tnLst>
+  </p:timing>
 </p:sld>
 </file>
 
@@ -12060,6 +12089,13 @@
   <p:clrMapOvr>
     <a:masterClrMapping/>
   </p:clrMapOvr>
+  <p:timing>
+    <p:tnLst>
+      <p:par>
+        <p:cTn id="1" dur="indefinite" restart="never" nodeType="tmRoot"/>
+      </p:par>
+    </p:tnLst>
+  </p:timing>
 </p:sld>
 </file>
 
@@ -12759,6 +12795,13 @@
   <p:clrMapOvr>
     <a:masterClrMapping/>
   </p:clrMapOvr>
+  <p:timing>
+    <p:tnLst>
+      <p:par>
+        <p:cTn id="1" dur="indefinite" restart="never" nodeType="tmRoot"/>
+      </p:par>
+    </p:tnLst>
+  </p:timing>
 </p:sld>
 </file>
 
@@ -13466,6 +13509,1395 @@
     <p:extLst>
       <p:ext uri="{BB962C8B-B14F-4D97-AF65-F5344CB8AC3E}">
         <p14:creationId xmlns:p14="http://schemas.microsoft.com/office/powerpoint/2010/main" val="4039043249"/>
+      </p:ext>
+    </p:extLst>
+  </p:cSld>
+  <p:clrMapOvr>
+    <a:masterClrMapping/>
+  </p:clrMapOvr>
+  <p:timing>
+    <p:tnLst>
+      <p:par>
+        <p:cTn id="1" dur="indefinite" restart="never" nodeType="tmRoot"/>
+      </p:par>
+    </p:tnLst>
+  </p:timing>
+</p:sld>
+</file>
+
+<file path=ppt/slides/slide24.xml><?xml version="1.0" encoding="utf-8"?>
+<p:sld xmlns:a="http://schemas.openxmlformats.org/drawingml/2006/main" xmlns:r="http://schemas.openxmlformats.org/officeDocument/2006/relationships" xmlns:p="http://schemas.openxmlformats.org/presentationml/2006/main">
+  <p:cSld>
+    <p:spTree>
+      <p:nvGrpSpPr>
+        <p:cNvPr id="1" name=""/>
+        <p:cNvGrpSpPr/>
+        <p:nvPr/>
+      </p:nvGrpSpPr>
+      <p:grpSpPr>
+        <a:xfrm>
+          <a:off x="0" y="0"/>
+          <a:ext cx="0" cy="0"/>
+          <a:chOff x="0" y="0"/>
+          <a:chExt cx="0" cy="0"/>
+        </a:xfrm>
+      </p:grpSpPr>
+      <p:sp>
+        <p:nvSpPr>
+          <p:cNvPr id="4" name="Rectángulo 3"/>
+          <p:cNvSpPr/>
+          <p:nvPr/>
+        </p:nvSpPr>
+        <p:spPr>
+          <a:xfrm>
+            <a:off x="993058" y="1415845"/>
+            <a:ext cx="10392697" cy="688258"/>
+          </a:xfrm>
+          <a:prstGeom prst="rect">
+            <a:avLst/>
+          </a:prstGeom>
+          <a:solidFill>
+            <a:schemeClr val="bg1"/>
+          </a:solidFill>
+          <a:ln>
+            <a:solidFill>
+              <a:schemeClr val="bg1"/>
+            </a:solidFill>
+          </a:ln>
+        </p:spPr>
+        <p:style>
+          <a:lnRef idx="2">
+            <a:schemeClr val="accent1">
+              <a:shade val="50000"/>
+            </a:schemeClr>
+          </a:lnRef>
+          <a:fillRef idx="1">
+            <a:schemeClr val="accent1"/>
+          </a:fillRef>
+          <a:effectRef idx="0">
+            <a:schemeClr val="accent1"/>
+          </a:effectRef>
+          <a:fontRef idx="minor">
+            <a:schemeClr val="lt1"/>
+          </a:fontRef>
+        </p:style>
+        <p:txBody>
+          <a:bodyPr rtlCol="0" anchor="ctr"/>
+          <a:lstStyle/>
+          <a:p>
+            <a:pPr algn="ctr"/>
+            <a:endParaRPr lang="es-CO"/>
+          </a:p>
+        </p:txBody>
+      </p:sp>
+      <p:sp>
+        <p:nvSpPr>
+          <p:cNvPr id="5" name="Rectángulo 4"/>
+          <p:cNvSpPr/>
+          <p:nvPr/>
+        </p:nvSpPr>
+        <p:spPr>
+          <a:xfrm>
+            <a:off x="0" y="6169742"/>
+            <a:ext cx="12192000" cy="688258"/>
+          </a:xfrm>
+          <a:prstGeom prst="rect">
+            <a:avLst/>
+          </a:prstGeom>
+          <a:solidFill>
+            <a:schemeClr val="bg1"/>
+          </a:solidFill>
+          <a:ln>
+            <a:solidFill>
+              <a:schemeClr val="bg1"/>
+            </a:solidFill>
+          </a:ln>
+        </p:spPr>
+        <p:style>
+          <a:lnRef idx="2">
+            <a:schemeClr val="accent1">
+              <a:shade val="50000"/>
+            </a:schemeClr>
+          </a:lnRef>
+          <a:fillRef idx="1">
+            <a:schemeClr val="accent1"/>
+          </a:fillRef>
+          <a:effectRef idx="0">
+            <a:schemeClr val="accent1"/>
+          </a:effectRef>
+          <a:fontRef idx="minor">
+            <a:schemeClr val="lt1"/>
+          </a:fontRef>
+        </p:style>
+        <p:txBody>
+          <a:bodyPr rtlCol="0" anchor="ctr"/>
+          <a:lstStyle/>
+          <a:p>
+            <a:pPr algn="ctr"/>
+            <a:endParaRPr lang="es-CO"/>
+          </a:p>
+        </p:txBody>
+      </p:sp>
+      <p:sp>
+        <p:nvSpPr>
+          <p:cNvPr id="6" name="Rectángulo 5"/>
+          <p:cNvSpPr/>
+          <p:nvPr/>
+        </p:nvSpPr>
+        <p:spPr>
+          <a:xfrm>
+            <a:off x="1553495" y="1607572"/>
+            <a:ext cx="609601" cy="609601"/>
+          </a:xfrm>
+          <a:prstGeom prst="rect">
+            <a:avLst/>
+          </a:prstGeom>
+          <a:solidFill>
+            <a:srgbClr val="7030A0"/>
+          </a:solidFill>
+          <a:ln>
+            <a:solidFill>
+              <a:schemeClr val="tx1"/>
+            </a:solidFill>
+          </a:ln>
+        </p:spPr>
+        <p:style>
+          <a:lnRef idx="2">
+            <a:schemeClr val="accent1">
+              <a:shade val="50000"/>
+            </a:schemeClr>
+          </a:lnRef>
+          <a:fillRef idx="1">
+            <a:schemeClr val="accent1"/>
+          </a:fillRef>
+          <a:effectRef idx="0">
+            <a:schemeClr val="accent1"/>
+          </a:effectRef>
+          <a:fontRef idx="minor">
+            <a:schemeClr val="lt1"/>
+          </a:fontRef>
+        </p:style>
+        <p:txBody>
+          <a:bodyPr rtlCol="0" anchor="ctr"/>
+          <a:lstStyle/>
+          <a:p>
+            <a:pPr algn="ctr"/>
+            <a:endParaRPr lang="es-CO" dirty="0"/>
+          </a:p>
+        </p:txBody>
+      </p:sp>
+      <p:sp>
+        <p:nvSpPr>
+          <p:cNvPr id="7" name="CuadroTexto 6"/>
+          <p:cNvSpPr txBox="1"/>
+          <p:nvPr/>
+        </p:nvSpPr>
+        <p:spPr>
+          <a:xfrm>
+            <a:off x="1307690" y="2330244"/>
+            <a:ext cx="1101213" cy="369332"/>
+          </a:xfrm>
+          <a:prstGeom prst="rect">
+            <a:avLst/>
+          </a:prstGeom>
+          <a:noFill/>
+        </p:spPr>
+        <p:txBody>
+          <a:bodyPr wrap="square" rtlCol="0">
+            <a:spAutoFit/>
+          </a:bodyPr>
+          <a:lstStyle/>
+          <a:p>
+            <a:pPr algn="ctr"/>
+            <a:r>
+              <a:rPr lang="es-ES" dirty="0" smtClean="0"/>
+              <a:t>Servidor</a:t>
+            </a:r>
+            <a:endParaRPr lang="es-CO" dirty="0"/>
+          </a:p>
+        </p:txBody>
+      </p:sp>
+      <p:sp>
+        <p:nvSpPr>
+          <p:cNvPr id="8" name="Rectángulo 7"/>
+          <p:cNvSpPr/>
+          <p:nvPr/>
+        </p:nvSpPr>
+        <p:spPr>
+          <a:xfrm>
+            <a:off x="4006644" y="113071"/>
+            <a:ext cx="6340514" cy="5820697"/>
+          </a:xfrm>
+          <a:prstGeom prst="rect">
+            <a:avLst/>
+          </a:prstGeom>
+          <a:solidFill>
+            <a:schemeClr val="bg1">
+              <a:lumMod val="95000"/>
+            </a:schemeClr>
+          </a:solidFill>
+          <a:ln>
+            <a:solidFill>
+              <a:schemeClr val="bg1"/>
+            </a:solidFill>
+          </a:ln>
+        </p:spPr>
+        <p:style>
+          <a:lnRef idx="2">
+            <a:schemeClr val="accent1">
+              <a:shade val="50000"/>
+            </a:schemeClr>
+          </a:lnRef>
+          <a:fillRef idx="1">
+            <a:schemeClr val="accent1"/>
+          </a:fillRef>
+          <a:effectRef idx="0">
+            <a:schemeClr val="accent1"/>
+          </a:effectRef>
+          <a:fontRef idx="minor">
+            <a:schemeClr val="lt1"/>
+          </a:fontRef>
+        </p:style>
+        <p:txBody>
+          <a:bodyPr rtlCol="0" anchor="ctr"/>
+          <a:lstStyle/>
+          <a:p>
+            <a:pPr algn="ctr"/>
+            <a:endParaRPr lang="es-CO" dirty="0"/>
+          </a:p>
+        </p:txBody>
+      </p:sp>
+      <p:sp>
+        <p:nvSpPr>
+          <p:cNvPr id="9" name="CuadroTexto 8"/>
+          <p:cNvSpPr txBox="1"/>
+          <p:nvPr/>
+        </p:nvSpPr>
+        <p:spPr>
+          <a:xfrm>
+            <a:off x="6523702" y="6169742"/>
+            <a:ext cx="1479755" cy="369332"/>
+          </a:xfrm>
+          <a:prstGeom prst="rect">
+            <a:avLst/>
+          </a:prstGeom>
+          <a:noFill/>
+        </p:spPr>
+        <p:txBody>
+          <a:bodyPr wrap="square" rtlCol="0">
+            <a:spAutoFit/>
+          </a:bodyPr>
+          <a:lstStyle/>
+          <a:p>
+            <a:pPr algn="ctr"/>
+            <a:r>
+              <a:rPr lang="es-ES" dirty="0" smtClean="0"/>
+              <a:t>Aplicación</a:t>
+            </a:r>
+            <a:endParaRPr lang="es-CO" dirty="0"/>
+          </a:p>
+        </p:txBody>
+      </p:sp>
+      <p:cxnSp>
+        <p:nvCxnSpPr>
+          <p:cNvPr id="11" name="Conector recto de flecha 10"/>
+          <p:cNvCxnSpPr>
+            <a:stCxn id="6" idx="3"/>
+          </p:cNvCxnSpPr>
+          <p:nvPr/>
+        </p:nvCxnSpPr>
+        <p:spPr>
+          <a:xfrm flipV="1">
+            <a:off x="2163096" y="1912372"/>
+            <a:ext cx="1843548" cy="1"/>
+          </a:xfrm>
+          <a:prstGeom prst="straightConnector1">
+            <a:avLst/>
+          </a:prstGeom>
+          <a:ln>
+            <a:solidFill>
+              <a:schemeClr val="tx1"/>
+            </a:solidFill>
+            <a:headEnd type="triangle"/>
+            <a:tailEnd type="triangle"/>
+          </a:ln>
+        </p:spPr>
+        <p:style>
+          <a:lnRef idx="1">
+            <a:schemeClr val="accent1"/>
+          </a:lnRef>
+          <a:fillRef idx="0">
+            <a:schemeClr val="accent1"/>
+          </a:fillRef>
+          <a:effectRef idx="0">
+            <a:schemeClr val="accent1"/>
+          </a:effectRef>
+          <a:fontRef idx="minor">
+            <a:schemeClr val="tx1"/>
+          </a:fontRef>
+        </p:style>
+      </p:cxnSp>
+      <p:sp>
+        <p:nvSpPr>
+          <p:cNvPr id="12" name="Rectángulo 11"/>
+          <p:cNvSpPr/>
+          <p:nvPr/>
+        </p:nvSpPr>
+        <p:spPr>
+          <a:xfrm>
+            <a:off x="4329451" y="1669726"/>
+            <a:ext cx="1597742" cy="2678669"/>
+          </a:xfrm>
+          <a:prstGeom prst="rect">
+            <a:avLst/>
+          </a:prstGeom>
+          <a:solidFill>
+            <a:schemeClr val="bg1"/>
+          </a:solidFill>
+          <a:ln>
+            <a:solidFill>
+              <a:schemeClr val="tx1"/>
+            </a:solidFill>
+          </a:ln>
+        </p:spPr>
+        <p:style>
+          <a:lnRef idx="2">
+            <a:schemeClr val="accent1">
+              <a:shade val="50000"/>
+            </a:schemeClr>
+          </a:lnRef>
+          <a:fillRef idx="1">
+            <a:schemeClr val="accent1"/>
+          </a:fillRef>
+          <a:effectRef idx="0">
+            <a:schemeClr val="accent1"/>
+          </a:effectRef>
+          <a:fontRef idx="minor">
+            <a:schemeClr val="lt1"/>
+          </a:fontRef>
+        </p:style>
+        <p:txBody>
+          <a:bodyPr rtlCol="0" anchor="ctr"/>
+          <a:lstStyle/>
+          <a:p>
+            <a:pPr algn="ctr"/>
+            <a:endParaRPr lang="es-CO"/>
+          </a:p>
+        </p:txBody>
+      </p:sp>
+      <p:sp>
+        <p:nvSpPr>
+          <p:cNvPr id="13" name="Rectángulo 12"/>
+          <p:cNvSpPr/>
+          <p:nvPr/>
+        </p:nvSpPr>
+        <p:spPr>
+          <a:xfrm>
+            <a:off x="6293155" y="3106644"/>
+            <a:ext cx="1597742" cy="2678669"/>
+          </a:xfrm>
+          <a:prstGeom prst="rect">
+            <a:avLst/>
+          </a:prstGeom>
+          <a:solidFill>
+            <a:schemeClr val="bg1"/>
+          </a:solidFill>
+          <a:ln>
+            <a:solidFill>
+              <a:schemeClr val="tx1"/>
+            </a:solidFill>
+          </a:ln>
+        </p:spPr>
+        <p:style>
+          <a:lnRef idx="2">
+            <a:schemeClr val="accent1">
+              <a:shade val="50000"/>
+            </a:schemeClr>
+          </a:lnRef>
+          <a:fillRef idx="1">
+            <a:schemeClr val="accent1"/>
+          </a:fillRef>
+          <a:effectRef idx="0">
+            <a:schemeClr val="accent1"/>
+          </a:effectRef>
+          <a:fontRef idx="minor">
+            <a:schemeClr val="lt1"/>
+          </a:fontRef>
+        </p:style>
+        <p:txBody>
+          <a:bodyPr rtlCol="0" anchor="ctr"/>
+          <a:lstStyle/>
+          <a:p>
+            <a:pPr algn="ctr"/>
+            <a:endParaRPr lang="es-CO"/>
+          </a:p>
+        </p:txBody>
+      </p:sp>
+      <p:sp>
+        <p:nvSpPr>
+          <p:cNvPr id="14" name="Rectángulo 13"/>
+          <p:cNvSpPr/>
+          <p:nvPr/>
+        </p:nvSpPr>
+        <p:spPr>
+          <a:xfrm>
+            <a:off x="5138154" y="3757867"/>
+            <a:ext cx="722670" cy="332689"/>
+          </a:xfrm>
+          <a:prstGeom prst="rect">
+            <a:avLst/>
+          </a:prstGeom>
+          <a:solidFill>
+            <a:schemeClr val="accent2">
+              <a:lumMod val="20000"/>
+              <a:lumOff val="80000"/>
+            </a:schemeClr>
+          </a:solidFill>
+          <a:ln>
+            <a:solidFill>
+              <a:schemeClr val="tx1"/>
+            </a:solidFill>
+          </a:ln>
+        </p:spPr>
+        <p:style>
+          <a:lnRef idx="2">
+            <a:schemeClr val="accent1">
+              <a:shade val="50000"/>
+            </a:schemeClr>
+          </a:lnRef>
+          <a:fillRef idx="1">
+            <a:schemeClr val="accent1"/>
+          </a:fillRef>
+          <a:effectRef idx="0">
+            <a:schemeClr val="accent1"/>
+          </a:effectRef>
+          <a:fontRef idx="minor">
+            <a:schemeClr val="lt1"/>
+          </a:fontRef>
+        </p:style>
+        <p:txBody>
+          <a:bodyPr rtlCol="0" anchor="ctr"/>
+          <a:lstStyle/>
+          <a:p>
+            <a:pPr algn="ctr"/>
+            <a:r>
+              <a:rPr lang="es-ES" sz="1400" dirty="0" err="1" smtClean="0">
+                <a:solidFill>
+                  <a:schemeClr val="tx1"/>
+                </a:solidFill>
+              </a:rPr>
+              <a:t>Sing</a:t>
+            </a:r>
+            <a:r>
+              <a:rPr lang="es-ES" sz="1400" dirty="0" smtClean="0">
+                <a:solidFill>
+                  <a:schemeClr val="tx1"/>
+                </a:solidFill>
+              </a:rPr>
+              <a:t> in</a:t>
+            </a:r>
+            <a:endParaRPr lang="es-CO" sz="1400" dirty="0">
+              <a:solidFill>
+                <a:schemeClr val="tx1"/>
+              </a:solidFill>
+            </a:endParaRPr>
+          </a:p>
+        </p:txBody>
+      </p:sp>
+      <p:sp>
+        <p:nvSpPr>
+          <p:cNvPr id="15" name="Rectángulo 14"/>
+          <p:cNvSpPr/>
+          <p:nvPr/>
+        </p:nvSpPr>
+        <p:spPr>
+          <a:xfrm>
+            <a:off x="4378142" y="3754534"/>
+            <a:ext cx="715515" cy="332689"/>
+          </a:xfrm>
+          <a:prstGeom prst="rect">
+            <a:avLst/>
+          </a:prstGeom>
+          <a:solidFill>
+            <a:schemeClr val="accent2">
+              <a:lumMod val="20000"/>
+              <a:lumOff val="80000"/>
+            </a:schemeClr>
+          </a:solidFill>
+          <a:ln>
+            <a:solidFill>
+              <a:schemeClr val="tx1"/>
+            </a:solidFill>
+          </a:ln>
+        </p:spPr>
+        <p:style>
+          <a:lnRef idx="2">
+            <a:schemeClr val="accent1">
+              <a:shade val="50000"/>
+            </a:schemeClr>
+          </a:lnRef>
+          <a:fillRef idx="1">
+            <a:schemeClr val="accent1"/>
+          </a:fillRef>
+          <a:effectRef idx="0">
+            <a:schemeClr val="accent1"/>
+          </a:effectRef>
+          <a:fontRef idx="minor">
+            <a:schemeClr val="lt1"/>
+          </a:fontRef>
+        </p:style>
+        <p:txBody>
+          <a:bodyPr rtlCol="0" anchor="ctr"/>
+          <a:lstStyle/>
+          <a:p>
+            <a:pPr algn="ctr"/>
+            <a:r>
+              <a:rPr lang="es-ES" sz="1400" dirty="0" err="1" smtClean="0">
+                <a:solidFill>
+                  <a:schemeClr val="tx1"/>
+                </a:solidFill>
+              </a:rPr>
+              <a:t>Sing</a:t>
+            </a:r>
+            <a:r>
+              <a:rPr lang="es-ES" sz="1400" dirty="0" smtClean="0">
+                <a:solidFill>
+                  <a:schemeClr val="tx1"/>
+                </a:solidFill>
+              </a:rPr>
+              <a:t> up</a:t>
+            </a:r>
+            <a:endParaRPr lang="es-CO" sz="1400" dirty="0">
+              <a:solidFill>
+                <a:schemeClr val="tx1"/>
+              </a:solidFill>
+            </a:endParaRPr>
+          </a:p>
+        </p:txBody>
+      </p:sp>
+      <p:pic>
+        <p:nvPicPr>
+          <p:cNvPr id="16" name="Picture 14"/>
+          <p:cNvPicPr/>
+          <p:nvPr/>
+        </p:nvPicPr>
+        <p:blipFill>
+          <a:blip r:embed="rId2"/>
+          <a:stretch>
+            <a:fillRect/>
+          </a:stretch>
+        </p:blipFill>
+        <p:spPr>
+          <a:xfrm>
+            <a:off x="4453867" y="2555844"/>
+            <a:ext cx="1279579" cy="400696"/>
+          </a:xfrm>
+          <a:prstGeom prst="rect">
+            <a:avLst/>
+          </a:prstGeom>
+        </p:spPr>
+      </p:pic>
+      <p:sp>
+        <p:nvSpPr>
+          <p:cNvPr id="17" name="Rectángulo 16"/>
+          <p:cNvSpPr/>
+          <p:nvPr/>
+        </p:nvSpPr>
+        <p:spPr>
+          <a:xfrm>
+            <a:off x="6293155" y="247915"/>
+            <a:ext cx="1597742" cy="2678669"/>
+          </a:xfrm>
+          <a:prstGeom prst="rect">
+            <a:avLst/>
+          </a:prstGeom>
+          <a:solidFill>
+            <a:schemeClr val="bg1"/>
+          </a:solidFill>
+          <a:ln>
+            <a:solidFill>
+              <a:schemeClr val="tx1"/>
+            </a:solidFill>
+          </a:ln>
+        </p:spPr>
+        <p:style>
+          <a:lnRef idx="2">
+            <a:schemeClr val="accent1">
+              <a:shade val="50000"/>
+            </a:schemeClr>
+          </a:lnRef>
+          <a:fillRef idx="1">
+            <a:schemeClr val="accent1"/>
+          </a:fillRef>
+          <a:effectRef idx="0">
+            <a:schemeClr val="accent1"/>
+          </a:effectRef>
+          <a:fontRef idx="minor">
+            <a:schemeClr val="lt1"/>
+          </a:fontRef>
+        </p:style>
+        <p:txBody>
+          <a:bodyPr rtlCol="0" anchor="ctr"/>
+          <a:lstStyle/>
+          <a:p>
+            <a:pPr algn="ctr"/>
+            <a:endParaRPr lang="es-CO"/>
+          </a:p>
+        </p:txBody>
+      </p:sp>
+      <p:sp>
+        <p:nvSpPr>
+          <p:cNvPr id="18" name="Rectángulo 17"/>
+          <p:cNvSpPr/>
+          <p:nvPr/>
+        </p:nvSpPr>
+        <p:spPr>
+          <a:xfrm>
+            <a:off x="8333860" y="1684084"/>
+            <a:ext cx="1597742" cy="2678669"/>
+          </a:xfrm>
+          <a:prstGeom prst="rect">
+            <a:avLst/>
+          </a:prstGeom>
+          <a:solidFill>
+            <a:schemeClr val="bg1"/>
+          </a:solidFill>
+          <a:ln>
+            <a:solidFill>
+              <a:schemeClr val="tx1"/>
+            </a:solidFill>
+          </a:ln>
+        </p:spPr>
+        <p:style>
+          <a:lnRef idx="2">
+            <a:schemeClr val="accent1">
+              <a:shade val="50000"/>
+            </a:schemeClr>
+          </a:lnRef>
+          <a:fillRef idx="1">
+            <a:schemeClr val="accent1"/>
+          </a:fillRef>
+          <a:effectRef idx="0">
+            <a:schemeClr val="accent1"/>
+          </a:effectRef>
+          <a:fontRef idx="minor">
+            <a:schemeClr val="lt1"/>
+          </a:fontRef>
+        </p:style>
+        <p:txBody>
+          <a:bodyPr rtlCol="0" anchor="ctr"/>
+          <a:lstStyle/>
+          <a:p>
+            <a:pPr algn="ctr"/>
+            <a:endParaRPr lang="es-CO"/>
+          </a:p>
+        </p:txBody>
+      </p:sp>
+      <p:cxnSp>
+        <p:nvCxnSpPr>
+          <p:cNvPr id="20" name="Conector recto de flecha 19"/>
+          <p:cNvCxnSpPr/>
+          <p:nvPr/>
+        </p:nvCxnSpPr>
+        <p:spPr>
+          <a:xfrm>
+            <a:off x="5733446" y="3859731"/>
+            <a:ext cx="559709" cy="0"/>
+          </a:xfrm>
+          <a:prstGeom prst="straightConnector1">
+            <a:avLst/>
+          </a:prstGeom>
+          <a:ln>
+            <a:solidFill>
+              <a:schemeClr val="tx1"/>
+            </a:solidFill>
+            <a:tailEnd type="triangle"/>
+          </a:ln>
+        </p:spPr>
+        <p:style>
+          <a:lnRef idx="1">
+            <a:schemeClr val="accent1"/>
+          </a:lnRef>
+          <a:fillRef idx="0">
+            <a:schemeClr val="accent1"/>
+          </a:fillRef>
+          <a:effectRef idx="0">
+            <a:schemeClr val="accent1"/>
+          </a:effectRef>
+          <a:fontRef idx="minor">
+            <a:schemeClr val="tx1"/>
+          </a:fontRef>
+        </p:style>
+      </p:cxnSp>
+      <p:cxnSp>
+        <p:nvCxnSpPr>
+          <p:cNvPr id="21" name="Conector recto de flecha 20"/>
+          <p:cNvCxnSpPr/>
+          <p:nvPr/>
+        </p:nvCxnSpPr>
+        <p:spPr>
+          <a:xfrm flipV="1">
+            <a:off x="4735899" y="2699577"/>
+            <a:ext cx="1557256" cy="1155005"/>
+          </a:xfrm>
+          <a:prstGeom prst="straightConnector1">
+            <a:avLst/>
+          </a:prstGeom>
+          <a:ln>
+            <a:solidFill>
+              <a:schemeClr val="tx1"/>
+            </a:solidFill>
+            <a:tailEnd type="triangle"/>
+          </a:ln>
+        </p:spPr>
+        <p:style>
+          <a:lnRef idx="1">
+            <a:schemeClr val="accent1"/>
+          </a:lnRef>
+          <a:fillRef idx="0">
+            <a:schemeClr val="accent1"/>
+          </a:fillRef>
+          <a:effectRef idx="0">
+            <a:schemeClr val="accent1"/>
+          </a:effectRef>
+          <a:fontRef idx="minor">
+            <a:schemeClr val="tx1"/>
+          </a:fontRef>
+        </p:style>
+      </p:cxnSp>
+      <p:sp>
+        <p:nvSpPr>
+          <p:cNvPr id="25" name="Rectángulo 24"/>
+          <p:cNvSpPr/>
+          <p:nvPr/>
+        </p:nvSpPr>
+        <p:spPr>
+          <a:xfrm>
+            <a:off x="6513711" y="1005038"/>
+            <a:ext cx="1156629" cy="297737"/>
+          </a:xfrm>
+          <a:prstGeom prst="rect">
+            <a:avLst/>
+          </a:prstGeom>
+          <a:solidFill>
+            <a:schemeClr val="bg1"/>
+          </a:solidFill>
+          <a:ln>
+            <a:solidFill>
+              <a:schemeClr val="tx1"/>
+            </a:solidFill>
+          </a:ln>
+        </p:spPr>
+        <p:style>
+          <a:lnRef idx="2">
+            <a:schemeClr val="accent1">
+              <a:shade val="50000"/>
+            </a:schemeClr>
+          </a:lnRef>
+          <a:fillRef idx="1">
+            <a:schemeClr val="accent1"/>
+          </a:fillRef>
+          <a:effectRef idx="0">
+            <a:schemeClr val="accent1"/>
+          </a:effectRef>
+          <a:fontRef idx="minor">
+            <a:schemeClr val="lt1"/>
+          </a:fontRef>
+        </p:style>
+        <p:txBody>
+          <a:bodyPr rtlCol="0" anchor="ctr"/>
+          <a:lstStyle/>
+          <a:p>
+            <a:r>
+              <a:rPr lang="es-ES" sz="1400" dirty="0" smtClean="0">
+                <a:solidFill>
+                  <a:schemeClr val="tx1"/>
+                </a:solidFill>
+              </a:rPr>
+              <a:t>Correo </a:t>
+            </a:r>
+            <a:endParaRPr lang="es-CO" sz="1400" dirty="0">
+              <a:solidFill>
+                <a:schemeClr val="tx1"/>
+              </a:solidFill>
+            </a:endParaRPr>
+          </a:p>
+        </p:txBody>
+      </p:sp>
+      <p:sp>
+        <p:nvSpPr>
+          <p:cNvPr id="26" name="Rectángulo 25"/>
+          <p:cNvSpPr/>
+          <p:nvPr/>
+        </p:nvSpPr>
+        <p:spPr>
+          <a:xfrm>
+            <a:off x="6513710" y="1357440"/>
+            <a:ext cx="1156629" cy="297737"/>
+          </a:xfrm>
+          <a:prstGeom prst="rect">
+            <a:avLst/>
+          </a:prstGeom>
+          <a:solidFill>
+            <a:schemeClr val="bg1"/>
+          </a:solidFill>
+          <a:ln>
+            <a:solidFill>
+              <a:schemeClr val="tx1"/>
+            </a:solidFill>
+          </a:ln>
+        </p:spPr>
+        <p:style>
+          <a:lnRef idx="2">
+            <a:schemeClr val="accent1">
+              <a:shade val="50000"/>
+            </a:schemeClr>
+          </a:lnRef>
+          <a:fillRef idx="1">
+            <a:schemeClr val="accent1"/>
+          </a:fillRef>
+          <a:effectRef idx="0">
+            <a:schemeClr val="accent1"/>
+          </a:effectRef>
+          <a:fontRef idx="minor">
+            <a:schemeClr val="lt1"/>
+          </a:fontRef>
+        </p:style>
+        <p:txBody>
+          <a:bodyPr rtlCol="0" anchor="ctr"/>
+          <a:lstStyle/>
+          <a:p>
+            <a:r>
+              <a:rPr lang="es-ES" sz="1400" dirty="0" smtClean="0">
+                <a:solidFill>
+                  <a:schemeClr val="tx1"/>
+                </a:solidFill>
+              </a:rPr>
+              <a:t>Clave </a:t>
+            </a:r>
+            <a:endParaRPr lang="es-CO" sz="1400" dirty="0">
+              <a:solidFill>
+                <a:schemeClr val="tx1"/>
+              </a:solidFill>
+            </a:endParaRPr>
+          </a:p>
+        </p:txBody>
+      </p:sp>
+      <p:sp>
+        <p:nvSpPr>
+          <p:cNvPr id="27" name="Rectángulo 26"/>
+          <p:cNvSpPr/>
+          <p:nvPr/>
+        </p:nvSpPr>
+        <p:spPr>
+          <a:xfrm>
+            <a:off x="6523702" y="1730771"/>
+            <a:ext cx="1156629" cy="297737"/>
+          </a:xfrm>
+          <a:prstGeom prst="rect">
+            <a:avLst/>
+          </a:prstGeom>
+          <a:solidFill>
+            <a:schemeClr val="bg1"/>
+          </a:solidFill>
+          <a:ln>
+            <a:solidFill>
+              <a:schemeClr val="tx1"/>
+            </a:solidFill>
+          </a:ln>
+        </p:spPr>
+        <p:style>
+          <a:lnRef idx="2">
+            <a:schemeClr val="accent1">
+              <a:shade val="50000"/>
+            </a:schemeClr>
+          </a:lnRef>
+          <a:fillRef idx="1">
+            <a:schemeClr val="accent1"/>
+          </a:fillRef>
+          <a:effectRef idx="0">
+            <a:schemeClr val="accent1"/>
+          </a:effectRef>
+          <a:fontRef idx="minor">
+            <a:schemeClr val="lt1"/>
+          </a:fontRef>
+        </p:style>
+        <p:txBody>
+          <a:bodyPr rtlCol="0" anchor="ctr"/>
+          <a:lstStyle/>
+          <a:p>
+            <a:r>
+              <a:rPr lang="es-ES" sz="1400" dirty="0" smtClean="0">
+                <a:solidFill>
+                  <a:schemeClr val="tx1"/>
+                </a:solidFill>
+              </a:rPr>
+              <a:t>Clave </a:t>
+            </a:r>
+            <a:endParaRPr lang="es-CO" sz="1400" dirty="0">
+              <a:solidFill>
+                <a:schemeClr val="tx1"/>
+              </a:solidFill>
+            </a:endParaRPr>
+          </a:p>
+        </p:txBody>
+      </p:sp>
+      <p:sp>
+        <p:nvSpPr>
+          <p:cNvPr id="28" name="Rectángulo 27"/>
+          <p:cNvSpPr/>
+          <p:nvPr/>
+        </p:nvSpPr>
+        <p:spPr>
+          <a:xfrm>
+            <a:off x="6523702" y="2321836"/>
+            <a:ext cx="1156629" cy="297737"/>
+          </a:xfrm>
+          <a:prstGeom prst="rect">
+            <a:avLst/>
+          </a:prstGeom>
+          <a:solidFill>
+            <a:schemeClr val="accent2">
+              <a:lumMod val="20000"/>
+              <a:lumOff val="80000"/>
+            </a:schemeClr>
+          </a:solidFill>
+          <a:ln>
+            <a:solidFill>
+              <a:schemeClr val="tx1"/>
+            </a:solidFill>
+          </a:ln>
+        </p:spPr>
+        <p:style>
+          <a:lnRef idx="2">
+            <a:schemeClr val="accent1">
+              <a:shade val="50000"/>
+            </a:schemeClr>
+          </a:lnRef>
+          <a:fillRef idx="1">
+            <a:schemeClr val="accent1"/>
+          </a:fillRef>
+          <a:effectRef idx="0">
+            <a:schemeClr val="accent1"/>
+          </a:effectRef>
+          <a:fontRef idx="minor">
+            <a:schemeClr val="lt1"/>
+          </a:fontRef>
+        </p:style>
+        <p:txBody>
+          <a:bodyPr rtlCol="0" anchor="ctr"/>
+          <a:lstStyle/>
+          <a:p>
+            <a:pPr algn="ctr"/>
+            <a:r>
+              <a:rPr lang="es-ES" sz="1400" dirty="0" smtClean="0">
+                <a:solidFill>
+                  <a:schemeClr val="tx1"/>
+                </a:solidFill>
+              </a:rPr>
+              <a:t>Registrarse </a:t>
+            </a:r>
+            <a:endParaRPr lang="es-CO" sz="1400" dirty="0">
+              <a:solidFill>
+                <a:schemeClr val="tx1"/>
+              </a:solidFill>
+            </a:endParaRPr>
+          </a:p>
+        </p:txBody>
+      </p:sp>
+      <p:sp>
+        <p:nvSpPr>
+          <p:cNvPr id="29" name="Rectángulo 28"/>
+          <p:cNvSpPr/>
+          <p:nvPr/>
+        </p:nvSpPr>
+        <p:spPr>
+          <a:xfrm>
+            <a:off x="6523702" y="5186189"/>
+            <a:ext cx="1156629" cy="297737"/>
+          </a:xfrm>
+          <a:prstGeom prst="rect">
+            <a:avLst/>
+          </a:prstGeom>
+          <a:solidFill>
+            <a:schemeClr val="accent2">
+              <a:lumMod val="20000"/>
+              <a:lumOff val="80000"/>
+            </a:schemeClr>
+          </a:solidFill>
+          <a:ln>
+            <a:solidFill>
+              <a:schemeClr val="tx1"/>
+            </a:solidFill>
+          </a:ln>
+        </p:spPr>
+        <p:style>
+          <a:lnRef idx="2">
+            <a:schemeClr val="accent1">
+              <a:shade val="50000"/>
+            </a:schemeClr>
+          </a:lnRef>
+          <a:fillRef idx="1">
+            <a:schemeClr val="accent1"/>
+          </a:fillRef>
+          <a:effectRef idx="0">
+            <a:schemeClr val="accent1"/>
+          </a:effectRef>
+          <a:fontRef idx="minor">
+            <a:schemeClr val="lt1"/>
+          </a:fontRef>
+        </p:style>
+        <p:txBody>
+          <a:bodyPr rtlCol="0" anchor="ctr"/>
+          <a:lstStyle/>
+          <a:p>
+            <a:pPr algn="ctr"/>
+            <a:r>
+              <a:rPr lang="es-ES" sz="1400" dirty="0" err="1" smtClean="0">
+                <a:solidFill>
+                  <a:schemeClr val="tx1"/>
+                </a:solidFill>
+              </a:rPr>
+              <a:t>Login</a:t>
+            </a:r>
+            <a:r>
+              <a:rPr lang="es-ES" sz="1400" dirty="0" smtClean="0">
+                <a:solidFill>
+                  <a:schemeClr val="tx1"/>
+                </a:solidFill>
+              </a:rPr>
+              <a:t> </a:t>
+            </a:r>
+            <a:endParaRPr lang="es-CO" sz="1400" dirty="0">
+              <a:solidFill>
+                <a:schemeClr val="tx1"/>
+              </a:solidFill>
+            </a:endParaRPr>
+          </a:p>
+        </p:txBody>
+      </p:sp>
+      <p:sp>
+        <p:nvSpPr>
+          <p:cNvPr id="30" name="Rectángulo 29"/>
+          <p:cNvSpPr/>
+          <p:nvPr/>
+        </p:nvSpPr>
+        <p:spPr>
+          <a:xfrm>
+            <a:off x="6523703" y="3984195"/>
+            <a:ext cx="1156629" cy="297737"/>
+          </a:xfrm>
+          <a:prstGeom prst="rect">
+            <a:avLst/>
+          </a:prstGeom>
+          <a:solidFill>
+            <a:schemeClr val="bg1"/>
+          </a:solidFill>
+          <a:ln>
+            <a:solidFill>
+              <a:schemeClr val="tx1"/>
+            </a:solidFill>
+          </a:ln>
+        </p:spPr>
+        <p:style>
+          <a:lnRef idx="2">
+            <a:schemeClr val="accent1">
+              <a:shade val="50000"/>
+            </a:schemeClr>
+          </a:lnRef>
+          <a:fillRef idx="1">
+            <a:schemeClr val="accent1"/>
+          </a:fillRef>
+          <a:effectRef idx="0">
+            <a:schemeClr val="accent1"/>
+          </a:effectRef>
+          <a:fontRef idx="minor">
+            <a:schemeClr val="lt1"/>
+          </a:fontRef>
+        </p:style>
+        <p:txBody>
+          <a:bodyPr rtlCol="0" anchor="ctr"/>
+          <a:lstStyle/>
+          <a:p>
+            <a:r>
+              <a:rPr lang="es-ES" sz="1400" dirty="0" smtClean="0">
+                <a:solidFill>
+                  <a:schemeClr val="tx1"/>
+                </a:solidFill>
+              </a:rPr>
+              <a:t>Correo </a:t>
+            </a:r>
+            <a:endParaRPr lang="es-CO" sz="1400" dirty="0">
+              <a:solidFill>
+                <a:schemeClr val="tx1"/>
+              </a:solidFill>
+            </a:endParaRPr>
+          </a:p>
+        </p:txBody>
+      </p:sp>
+      <p:sp>
+        <p:nvSpPr>
+          <p:cNvPr id="31" name="Rectángulo 30"/>
+          <p:cNvSpPr/>
+          <p:nvPr/>
+        </p:nvSpPr>
+        <p:spPr>
+          <a:xfrm>
+            <a:off x="6523702" y="4336597"/>
+            <a:ext cx="1156629" cy="297737"/>
+          </a:xfrm>
+          <a:prstGeom prst="rect">
+            <a:avLst/>
+          </a:prstGeom>
+          <a:solidFill>
+            <a:schemeClr val="bg1"/>
+          </a:solidFill>
+          <a:ln>
+            <a:solidFill>
+              <a:schemeClr val="tx1"/>
+            </a:solidFill>
+          </a:ln>
+        </p:spPr>
+        <p:style>
+          <a:lnRef idx="2">
+            <a:schemeClr val="accent1">
+              <a:shade val="50000"/>
+            </a:schemeClr>
+          </a:lnRef>
+          <a:fillRef idx="1">
+            <a:schemeClr val="accent1"/>
+          </a:fillRef>
+          <a:effectRef idx="0">
+            <a:schemeClr val="accent1"/>
+          </a:effectRef>
+          <a:fontRef idx="minor">
+            <a:schemeClr val="lt1"/>
+          </a:fontRef>
+        </p:style>
+        <p:txBody>
+          <a:bodyPr rtlCol="0" anchor="ctr"/>
+          <a:lstStyle/>
+          <a:p>
+            <a:r>
+              <a:rPr lang="es-ES" sz="1400" dirty="0" smtClean="0">
+                <a:solidFill>
+                  <a:schemeClr val="tx1"/>
+                </a:solidFill>
+              </a:rPr>
+              <a:t>Clave </a:t>
+            </a:r>
+            <a:endParaRPr lang="es-CO" sz="1400" dirty="0">
+              <a:solidFill>
+                <a:schemeClr val="tx1"/>
+              </a:solidFill>
+            </a:endParaRPr>
+          </a:p>
+        </p:txBody>
+      </p:sp>
+      <p:cxnSp>
+        <p:nvCxnSpPr>
+          <p:cNvPr id="32" name="Conector recto de flecha 31"/>
+          <p:cNvCxnSpPr/>
+          <p:nvPr/>
+        </p:nvCxnSpPr>
+        <p:spPr>
+          <a:xfrm>
+            <a:off x="7611042" y="2367141"/>
+            <a:ext cx="722818" cy="0"/>
+          </a:xfrm>
+          <a:prstGeom prst="straightConnector1">
+            <a:avLst/>
+          </a:prstGeom>
+          <a:ln>
+            <a:solidFill>
+              <a:schemeClr val="tx1"/>
+            </a:solidFill>
+            <a:tailEnd type="triangle"/>
+          </a:ln>
+        </p:spPr>
+        <p:style>
+          <a:lnRef idx="1">
+            <a:schemeClr val="accent1"/>
+          </a:lnRef>
+          <a:fillRef idx="0">
+            <a:schemeClr val="accent1"/>
+          </a:fillRef>
+          <a:effectRef idx="0">
+            <a:schemeClr val="accent1"/>
+          </a:effectRef>
+          <a:fontRef idx="minor">
+            <a:schemeClr val="tx1"/>
+          </a:fontRef>
+        </p:style>
+      </p:cxnSp>
+      <p:cxnSp>
+        <p:nvCxnSpPr>
+          <p:cNvPr id="34" name="Conector recto de flecha 33"/>
+          <p:cNvCxnSpPr/>
+          <p:nvPr/>
+        </p:nvCxnSpPr>
+        <p:spPr>
+          <a:xfrm flipV="1">
+            <a:off x="7529488" y="3984195"/>
+            <a:ext cx="804372" cy="1307422"/>
+          </a:xfrm>
+          <a:prstGeom prst="straightConnector1">
+            <a:avLst/>
+          </a:prstGeom>
+          <a:ln>
+            <a:solidFill>
+              <a:schemeClr val="tx1"/>
+            </a:solidFill>
+            <a:tailEnd type="triangle"/>
+          </a:ln>
+        </p:spPr>
+        <p:style>
+          <a:lnRef idx="1">
+            <a:schemeClr val="accent1"/>
+          </a:lnRef>
+          <a:fillRef idx="0">
+            <a:schemeClr val="accent1"/>
+          </a:fillRef>
+          <a:effectRef idx="0">
+            <a:schemeClr val="accent1"/>
+          </a:effectRef>
+          <a:fontRef idx="minor">
+            <a:schemeClr val="tx1"/>
+          </a:fontRef>
+        </p:style>
+      </p:cxnSp>
+      <p:sp>
+        <p:nvSpPr>
+          <p:cNvPr id="36" name="Rectángulo 35"/>
+          <p:cNvSpPr/>
+          <p:nvPr/>
+        </p:nvSpPr>
+        <p:spPr>
+          <a:xfrm>
+            <a:off x="6619330" y="347182"/>
+            <a:ext cx="945387" cy="369332"/>
+          </a:xfrm>
+          <a:prstGeom prst="rect">
+            <a:avLst/>
+          </a:prstGeom>
+        </p:spPr>
+        <p:txBody>
+          <a:bodyPr wrap="none">
+            <a:spAutoFit/>
+          </a:bodyPr>
+          <a:lstStyle/>
+          <a:p>
+            <a:r>
+              <a:rPr lang="es-ES" dirty="0" smtClean="0"/>
+              <a:t>Registro</a:t>
+            </a:r>
+            <a:endParaRPr lang="es-CO" dirty="0"/>
+          </a:p>
+        </p:txBody>
+      </p:sp>
+      <p:sp>
+        <p:nvSpPr>
+          <p:cNvPr id="37" name="Rectángulo 36"/>
+          <p:cNvSpPr/>
+          <p:nvPr/>
+        </p:nvSpPr>
+        <p:spPr>
+          <a:xfrm>
+            <a:off x="6763726" y="3211268"/>
+            <a:ext cx="688009" cy="369332"/>
+          </a:xfrm>
+          <a:prstGeom prst="rect">
+            <a:avLst/>
+          </a:prstGeom>
+        </p:spPr>
+        <p:txBody>
+          <a:bodyPr wrap="none">
+            <a:spAutoFit/>
+          </a:bodyPr>
+          <a:lstStyle/>
+          <a:p>
+            <a:r>
+              <a:rPr lang="es-ES" dirty="0" err="1" smtClean="0"/>
+              <a:t>Login</a:t>
+            </a:r>
+            <a:endParaRPr lang="es-CO" dirty="0"/>
+          </a:p>
+        </p:txBody>
+      </p:sp>
+      <p:sp>
+        <p:nvSpPr>
+          <p:cNvPr id="38" name="Rectángulo 37"/>
+          <p:cNvSpPr/>
+          <p:nvPr/>
+        </p:nvSpPr>
+        <p:spPr>
+          <a:xfrm>
+            <a:off x="8521925" y="1734771"/>
+            <a:ext cx="1231747" cy="369332"/>
+          </a:xfrm>
+          <a:prstGeom prst="rect">
+            <a:avLst/>
+          </a:prstGeom>
+        </p:spPr>
+        <p:txBody>
+          <a:bodyPr wrap="none">
+            <a:spAutoFit/>
+          </a:bodyPr>
+          <a:lstStyle/>
+          <a:p>
+            <a:r>
+              <a:rPr lang="es-ES" dirty="0" smtClean="0"/>
+              <a:t>Bienvenido</a:t>
+            </a:r>
+            <a:endParaRPr lang="es-CO" dirty="0"/>
+          </a:p>
+        </p:txBody>
+      </p:sp>
+      <p:pic>
+        <p:nvPicPr>
+          <p:cNvPr id="1026" name="Picture 2" descr="Resultado de imagen para logo icesi"/>
+          <p:cNvPicPr>
+            <a:picLocks noChangeAspect="1" noChangeArrowheads="1"/>
+          </p:cNvPicPr>
+          <p:nvPr/>
+        </p:nvPicPr>
+        <p:blipFill>
+          <a:blip r:embed="rId3">
+            <a:extLst>
+              <a:ext uri="{28A0092B-C50C-407E-A947-70E740481C1C}">
+                <a14:useLocalDpi xmlns:a14="http://schemas.microsoft.com/office/drawing/2010/main" val="0"/>
+              </a:ext>
+            </a:extLst>
+          </a:blip>
+          <a:srcRect/>
+          <a:stretch>
+            <a:fillRect/>
+          </a:stretch>
+        </p:blipFill>
+        <p:spPr bwMode="auto">
+          <a:xfrm>
+            <a:off x="8521925" y="2445275"/>
+            <a:ext cx="1289452" cy="1289452"/>
+          </a:xfrm>
+          <a:prstGeom prst="rect">
+            <a:avLst/>
+          </a:prstGeom>
+          <a:noFill/>
+          <a:extLst>
+            <a:ext uri="{909E8E84-426E-40DD-AFC4-6F175D3DCCD1}">
+              <a14:hiddenFill xmlns:a14="http://schemas.microsoft.com/office/drawing/2010/main">
+                <a:solidFill>
+                  <a:srgbClr val="FFFFFF"/>
+                </a:solidFill>
+              </a14:hiddenFill>
+            </a:ext>
+          </a:extLst>
+        </p:spPr>
+      </p:pic>
+    </p:spTree>
+    <p:extLst>
+      <p:ext uri="{BB962C8B-B14F-4D97-AF65-F5344CB8AC3E}">
+        <p14:creationId xmlns:p14="http://schemas.microsoft.com/office/powerpoint/2010/main" val="3872077077"/>
       </p:ext>
     </p:extLst>
   </p:cSld>

</xml_diff>